<commit_message>
Small Change on No Lunch
</commit_message>
<xml_diff>
--- a/Open Coding Challenge/ByteFest 2015 Spring Open Coding Session.pptx
+++ b/Open Coding Challenge/ByteFest 2015 Spring Open Coding Session.pptx
@@ -295,7 +295,7 @@
           <a:p>
             <a:fld id="{CC17490F-8B18-4129-9881-D0B6DA338B8F}" type="datetimeFigureOut">
               <a:rPr lang="en-US" smtClean="0"/>
-              <a:t>4/4/2015</a:t>
+              <a:t>4/6/2015</a:t>
             </a:fld>
             <a:endParaRPr lang="en-US"/>
           </a:p>
@@ -465,7 +465,7 @@
           <a:p>
             <a:fld id="{CC17490F-8B18-4129-9881-D0B6DA338B8F}" type="datetimeFigureOut">
               <a:rPr lang="en-US" smtClean="0"/>
-              <a:t>4/4/2015</a:t>
+              <a:t>4/6/2015</a:t>
             </a:fld>
             <a:endParaRPr lang="en-US"/>
           </a:p>
@@ -645,7 +645,7 @@
           <a:p>
             <a:fld id="{CC17490F-8B18-4129-9881-D0B6DA338B8F}" type="datetimeFigureOut">
               <a:rPr lang="en-US" smtClean="0"/>
-              <a:t>4/4/2015</a:t>
+              <a:t>4/6/2015</a:t>
             </a:fld>
             <a:endParaRPr lang="en-US"/>
           </a:p>
@@ -815,7 +815,7 @@
           <a:p>
             <a:fld id="{CC17490F-8B18-4129-9881-D0B6DA338B8F}" type="datetimeFigureOut">
               <a:rPr lang="en-US" smtClean="0"/>
-              <a:t>4/4/2015</a:t>
+              <a:t>4/6/2015</a:t>
             </a:fld>
             <a:endParaRPr lang="en-US"/>
           </a:p>
@@ -1061,7 +1061,7 @@
           <a:p>
             <a:fld id="{CC17490F-8B18-4129-9881-D0B6DA338B8F}" type="datetimeFigureOut">
               <a:rPr lang="en-US" smtClean="0"/>
-              <a:t>4/4/2015</a:t>
+              <a:t>4/6/2015</a:t>
             </a:fld>
             <a:endParaRPr lang="en-US"/>
           </a:p>
@@ -1349,7 +1349,7 @@
           <a:p>
             <a:fld id="{CC17490F-8B18-4129-9881-D0B6DA338B8F}" type="datetimeFigureOut">
               <a:rPr lang="en-US" smtClean="0"/>
-              <a:t>4/4/2015</a:t>
+              <a:t>4/6/2015</a:t>
             </a:fld>
             <a:endParaRPr lang="en-US"/>
           </a:p>
@@ -1771,7 +1771,7 @@
           <a:p>
             <a:fld id="{CC17490F-8B18-4129-9881-D0B6DA338B8F}" type="datetimeFigureOut">
               <a:rPr lang="en-US" smtClean="0"/>
-              <a:t>4/4/2015</a:t>
+              <a:t>4/6/2015</a:t>
             </a:fld>
             <a:endParaRPr lang="en-US"/>
           </a:p>
@@ -1889,7 +1889,7 @@
           <a:p>
             <a:fld id="{CC17490F-8B18-4129-9881-D0B6DA338B8F}" type="datetimeFigureOut">
               <a:rPr lang="en-US" smtClean="0"/>
-              <a:t>4/4/2015</a:t>
+              <a:t>4/6/2015</a:t>
             </a:fld>
             <a:endParaRPr lang="en-US"/>
           </a:p>
@@ -1984,7 +1984,7 @@
           <a:p>
             <a:fld id="{CC17490F-8B18-4129-9881-D0B6DA338B8F}" type="datetimeFigureOut">
               <a:rPr lang="en-US" smtClean="0"/>
-              <a:t>4/4/2015</a:t>
+              <a:t>4/6/2015</a:t>
             </a:fld>
             <a:endParaRPr lang="en-US"/>
           </a:p>
@@ -2261,7 +2261,7 @@
           <a:p>
             <a:fld id="{CC17490F-8B18-4129-9881-D0B6DA338B8F}" type="datetimeFigureOut">
               <a:rPr lang="en-US" smtClean="0"/>
-              <a:t>4/4/2015</a:t>
+              <a:t>4/6/2015</a:t>
             </a:fld>
             <a:endParaRPr lang="en-US"/>
           </a:p>
@@ -2514,7 +2514,7 @@
           <a:p>
             <a:fld id="{CC17490F-8B18-4129-9881-D0B6DA338B8F}" type="datetimeFigureOut">
               <a:rPr lang="en-US" smtClean="0"/>
-              <a:t>4/4/2015</a:t>
+              <a:t>4/6/2015</a:t>
             </a:fld>
             <a:endParaRPr lang="en-US"/>
           </a:p>
@@ -2727,7 +2727,7 @@
           <a:p>
             <a:fld id="{CC17490F-8B18-4129-9881-D0B6DA338B8F}" type="datetimeFigureOut">
               <a:rPr lang="en-US" smtClean="0"/>
-              <a:t>4/4/2015</a:t>
+              <a:t>4/6/2015</a:t>
             </a:fld>
             <a:endParaRPr lang="en-US"/>
           </a:p>
@@ -3939,8 +3939,13 @@
           <a:p>
             <a:r>
               <a:rPr lang="en-US" dirty="0" smtClean="0"/>
-              <a:t>You should bring a lunch</a:t>
-            </a:r>
+              <a:t>No lunch at </a:t>
+            </a:r>
+            <a:r>
+              <a:rPr lang="en-US" smtClean="0"/>
+              <a:t>the event</a:t>
+            </a:r>
+            <a:endParaRPr lang="en-US" dirty="0" smtClean="0"/>
           </a:p>
           <a:p>
             <a:r>

</xml_diff>